<commit_message>
Cleaned repo after merging iDash branch
</commit_message>
<xml_diff>
--- a/simul/test_data/graphs/MIE/timeline_cut.pptx
+++ b/simul/test_data/graphs/MIE/timeline_cut.pptx
@@ -5,10 +5,7 @@
     <p:sldMasterId id="2147483648" r:id="rId1"/>
   </p:sldMasterIdLst>
   <p:sldIdLst>
-    <p:sldId id="256" r:id="rId2"/>
-    <p:sldId id="257" r:id="rId3"/>
-    <p:sldId id="258" r:id="rId4"/>
-    <p:sldId id="259" r:id="rId5"/>
+    <p:sldId id="258" r:id="rId2"/>
   </p:sldIdLst>
   <p:sldSz cx="12192000" cy="6858000"/>
   <p:notesSz cx="6858000" cy="9144000"/>
@@ -262,7 +259,7 @@
           <a:p>
             <a:fld id="{91D59EC6-AF5C-764D-8528-FE6B8F560843}" type="datetimeFigureOut">
               <a:rPr lang="en-US" smtClean="0"/>
-              <a:t>10/15/19</a:t>
+              <a:t>10/16/19</a:t>
             </a:fld>
             <a:endParaRPr lang="en-US"/>
           </a:p>
@@ -460,7 +457,7 @@
           <a:p>
             <a:fld id="{91D59EC6-AF5C-764D-8528-FE6B8F560843}" type="datetimeFigureOut">
               <a:rPr lang="en-US" smtClean="0"/>
-              <a:t>10/15/19</a:t>
+              <a:t>10/16/19</a:t>
             </a:fld>
             <a:endParaRPr lang="en-US"/>
           </a:p>
@@ -668,7 +665,7 @@
           <a:p>
             <a:fld id="{91D59EC6-AF5C-764D-8528-FE6B8F560843}" type="datetimeFigureOut">
               <a:rPr lang="en-US" smtClean="0"/>
-              <a:t>10/15/19</a:t>
+              <a:t>10/16/19</a:t>
             </a:fld>
             <a:endParaRPr lang="en-US"/>
           </a:p>
@@ -866,7 +863,7 @@
           <a:p>
             <a:fld id="{91D59EC6-AF5C-764D-8528-FE6B8F560843}" type="datetimeFigureOut">
               <a:rPr lang="en-US" smtClean="0"/>
-              <a:t>10/15/19</a:t>
+              <a:t>10/16/19</a:t>
             </a:fld>
             <a:endParaRPr lang="en-US"/>
           </a:p>
@@ -1141,7 +1138,7 @@
           <a:p>
             <a:fld id="{91D59EC6-AF5C-764D-8528-FE6B8F560843}" type="datetimeFigureOut">
               <a:rPr lang="en-US" smtClean="0"/>
-              <a:t>10/15/19</a:t>
+              <a:t>10/16/19</a:t>
             </a:fld>
             <a:endParaRPr lang="en-US"/>
           </a:p>
@@ -1406,7 +1403,7 @@
           <a:p>
             <a:fld id="{91D59EC6-AF5C-764D-8528-FE6B8F560843}" type="datetimeFigureOut">
               <a:rPr lang="en-US" smtClean="0"/>
-              <a:t>10/15/19</a:t>
+              <a:t>10/16/19</a:t>
             </a:fld>
             <a:endParaRPr lang="en-US"/>
           </a:p>
@@ -1818,7 +1815,7 @@
           <a:p>
             <a:fld id="{91D59EC6-AF5C-764D-8528-FE6B8F560843}" type="datetimeFigureOut">
               <a:rPr lang="en-US" smtClean="0"/>
-              <a:t>10/15/19</a:t>
+              <a:t>10/16/19</a:t>
             </a:fld>
             <a:endParaRPr lang="en-US"/>
           </a:p>
@@ -1959,7 +1956,7 @@
           <a:p>
             <a:fld id="{91D59EC6-AF5C-764D-8528-FE6B8F560843}" type="datetimeFigureOut">
               <a:rPr lang="en-US" smtClean="0"/>
-              <a:t>10/15/19</a:t>
+              <a:t>10/16/19</a:t>
             </a:fld>
             <a:endParaRPr lang="en-US"/>
           </a:p>
@@ -2072,7 +2069,7 @@
           <a:p>
             <a:fld id="{91D59EC6-AF5C-764D-8528-FE6B8F560843}" type="datetimeFigureOut">
               <a:rPr lang="en-US" smtClean="0"/>
-              <a:t>10/15/19</a:t>
+              <a:t>10/16/19</a:t>
             </a:fld>
             <a:endParaRPr lang="en-US"/>
           </a:p>
@@ -2383,7 +2380,7 @@
           <a:p>
             <a:fld id="{91D59EC6-AF5C-764D-8528-FE6B8F560843}" type="datetimeFigureOut">
               <a:rPr lang="en-US" smtClean="0"/>
-              <a:t>10/15/19</a:t>
+              <a:t>10/16/19</a:t>
             </a:fld>
             <a:endParaRPr lang="en-US"/>
           </a:p>
@@ -2671,7 +2668,7 @@
           <a:p>
             <a:fld id="{91D59EC6-AF5C-764D-8528-FE6B8F560843}" type="datetimeFigureOut">
               <a:rPr lang="en-US" smtClean="0"/>
-              <a:t>10/15/19</a:t>
+              <a:t>10/16/19</a:t>
             </a:fld>
             <a:endParaRPr lang="en-US"/>
           </a:p>
@@ -2912,7 +2909,7 @@
           <a:p>
             <a:fld id="{91D59EC6-AF5C-764D-8528-FE6B8F560843}" type="datetimeFigureOut">
               <a:rPr lang="en-US" smtClean="0"/>
-              <a:t>10/15/19</a:t>
+              <a:t>10/16/19</a:t>
             </a:fld>
             <a:endParaRPr lang="en-US"/>
           </a:p>
@@ -3329,790 +3326,12 @@
           <a:chExt cx="0" cy="0"/>
         </a:xfrm>
       </p:grpSpPr>
-      <p:pic>
-        <p:nvPicPr>
-          <p:cNvPr id="11" name="Picture 10">
-            <a:extLst>
-              <a:ext uri="{FF2B5EF4-FFF2-40B4-BE49-F238E27FC236}">
-                <a16:creationId xmlns:a16="http://schemas.microsoft.com/office/drawing/2014/main" id="{C042707D-286F-A443-B065-29CC1D2FCE3F}"/>
-              </a:ext>
-            </a:extLst>
-          </p:cNvPr>
-          <p:cNvPicPr>
-            <a:picLocks noChangeAspect="1"/>
-          </p:cNvPicPr>
-          <p:nvPr/>
-        </p:nvPicPr>
-        <p:blipFill rotWithShape="1">
-          <a:blip r:embed="rId2"/>
-          <a:srcRect l="25" t="66667" r="7135" b="6933"/>
-          <a:stretch/>
-        </p:blipFill>
-        <p:spPr>
-          <a:xfrm>
-            <a:off x="1109472" y="3041904"/>
-            <a:ext cx="2865120" cy="1810512"/>
-          </a:xfrm>
-          <a:prstGeom prst="rect">
-            <a:avLst/>
-          </a:prstGeom>
-        </p:spPr>
-      </p:pic>
-      <p:pic>
-        <p:nvPicPr>
-          <p:cNvPr id="12" name="Picture 11">
-            <a:extLst>
-              <a:ext uri="{FF2B5EF4-FFF2-40B4-BE49-F238E27FC236}">
-                <a16:creationId xmlns:a16="http://schemas.microsoft.com/office/drawing/2014/main" id="{C826BC21-9AF2-C34E-8B9A-4E9D138D07B0}"/>
-              </a:ext>
-            </a:extLst>
-          </p:cNvPr>
-          <p:cNvPicPr>
-            <a:picLocks noChangeAspect="1"/>
-          </p:cNvPicPr>
-          <p:nvPr/>
-        </p:nvPicPr>
-        <p:blipFill rotWithShape="1">
-          <a:blip r:embed="rId2"/>
-          <a:srcRect l="25" t="11467" r="7135" b="60533"/>
-          <a:stretch/>
-        </p:blipFill>
-        <p:spPr>
-          <a:xfrm>
-            <a:off x="1109472" y="896112"/>
-            <a:ext cx="2865120" cy="1920240"/>
-          </a:xfrm>
-          <a:prstGeom prst="rect">
-            <a:avLst/>
-          </a:prstGeom>
-        </p:spPr>
-      </p:pic>
-      <p:cxnSp>
-        <p:nvCxnSpPr>
-          <p:cNvPr id="14" name="Straight Connector 13">
-            <a:extLst>
-              <a:ext uri="{FF2B5EF4-FFF2-40B4-BE49-F238E27FC236}">
-                <a16:creationId xmlns:a16="http://schemas.microsoft.com/office/drawing/2014/main" id="{DCC8C620-2B1D-5E49-8BFE-15427C1EAFC4}"/>
-              </a:ext>
-            </a:extLst>
-          </p:cNvPr>
-          <p:cNvCxnSpPr>
-            <a:cxnSpLocks/>
-          </p:cNvCxnSpPr>
-          <p:nvPr/>
-        </p:nvCxnSpPr>
-        <p:spPr>
-          <a:xfrm flipH="1" flipV="1">
-            <a:off x="1420368" y="2788158"/>
-            <a:ext cx="140208" cy="58674"/>
-          </a:xfrm>
-          <a:prstGeom prst="line">
-            <a:avLst/>
-          </a:prstGeom>
-          <a:ln w="9525">
-            <a:solidFill>
-              <a:schemeClr val="tx1"/>
-            </a:solidFill>
-          </a:ln>
-        </p:spPr>
-        <p:style>
-          <a:lnRef idx="1">
-            <a:schemeClr val="accent1"/>
-          </a:lnRef>
-          <a:fillRef idx="0">
-            <a:schemeClr val="accent1"/>
-          </a:fillRef>
-          <a:effectRef idx="0">
-            <a:schemeClr val="accent1"/>
-          </a:effectRef>
-          <a:fontRef idx="minor">
-            <a:schemeClr val="tx1"/>
-          </a:fontRef>
-        </p:style>
-      </p:cxnSp>
-      <p:cxnSp>
-        <p:nvCxnSpPr>
-          <p:cNvPr id="18" name="Straight Connector 17">
-            <a:extLst>
-              <a:ext uri="{FF2B5EF4-FFF2-40B4-BE49-F238E27FC236}">
-                <a16:creationId xmlns:a16="http://schemas.microsoft.com/office/drawing/2014/main" id="{F3543970-9E0F-5A44-BC95-2DAC6375FCF1}"/>
-              </a:ext>
-            </a:extLst>
-          </p:cNvPr>
-          <p:cNvCxnSpPr>
-            <a:cxnSpLocks/>
-          </p:cNvCxnSpPr>
-          <p:nvPr/>
-        </p:nvCxnSpPr>
-        <p:spPr>
-          <a:xfrm flipH="1" flipV="1">
-            <a:off x="1420368" y="3007614"/>
-            <a:ext cx="140208" cy="58674"/>
-          </a:xfrm>
-          <a:prstGeom prst="line">
-            <a:avLst/>
-          </a:prstGeom>
-          <a:ln w="9525">
-            <a:solidFill>
-              <a:schemeClr val="tx1"/>
-            </a:solidFill>
-          </a:ln>
-        </p:spPr>
-        <p:style>
-          <a:lnRef idx="1">
-            <a:schemeClr val="accent1"/>
-          </a:lnRef>
-          <a:fillRef idx="0">
-            <a:schemeClr val="accent1"/>
-          </a:fillRef>
-          <a:effectRef idx="0">
-            <a:schemeClr val="accent1"/>
-          </a:effectRef>
-          <a:fontRef idx="minor">
-            <a:schemeClr val="tx1"/>
-          </a:fontRef>
-        </p:style>
-      </p:cxnSp>
-      <p:cxnSp>
-        <p:nvCxnSpPr>
-          <p:cNvPr id="19" name="Straight Connector 18">
-            <a:extLst>
-              <a:ext uri="{FF2B5EF4-FFF2-40B4-BE49-F238E27FC236}">
-                <a16:creationId xmlns:a16="http://schemas.microsoft.com/office/drawing/2014/main" id="{CCCEA78C-7B41-B747-9D96-4DB875370B73}"/>
-              </a:ext>
-            </a:extLst>
-          </p:cNvPr>
-          <p:cNvCxnSpPr>
-            <a:cxnSpLocks/>
-          </p:cNvCxnSpPr>
-          <p:nvPr/>
-        </p:nvCxnSpPr>
-        <p:spPr>
-          <a:xfrm flipH="1" flipV="1">
-            <a:off x="3803904" y="2785110"/>
-            <a:ext cx="140208" cy="58674"/>
-          </a:xfrm>
-          <a:prstGeom prst="line">
-            <a:avLst/>
-          </a:prstGeom>
-          <a:ln w="9525">
-            <a:solidFill>
-              <a:schemeClr val="tx1"/>
-            </a:solidFill>
-          </a:ln>
-        </p:spPr>
-        <p:style>
-          <a:lnRef idx="1">
-            <a:schemeClr val="accent1"/>
-          </a:lnRef>
-          <a:fillRef idx="0">
-            <a:schemeClr val="accent1"/>
-          </a:fillRef>
-          <a:effectRef idx="0">
-            <a:schemeClr val="accent1"/>
-          </a:effectRef>
-          <a:fontRef idx="minor">
-            <a:schemeClr val="tx1"/>
-          </a:fontRef>
-        </p:style>
-      </p:cxnSp>
-      <p:cxnSp>
-        <p:nvCxnSpPr>
-          <p:cNvPr id="20" name="Straight Connector 19">
-            <a:extLst>
-              <a:ext uri="{FF2B5EF4-FFF2-40B4-BE49-F238E27FC236}">
-                <a16:creationId xmlns:a16="http://schemas.microsoft.com/office/drawing/2014/main" id="{733CC55E-6BCF-7441-90CB-5E484486C813}"/>
-              </a:ext>
-            </a:extLst>
-          </p:cNvPr>
-          <p:cNvCxnSpPr>
-            <a:cxnSpLocks/>
-          </p:cNvCxnSpPr>
-          <p:nvPr/>
-        </p:nvCxnSpPr>
-        <p:spPr>
-          <a:xfrm flipH="1" flipV="1">
-            <a:off x="3803904" y="3007614"/>
-            <a:ext cx="140208" cy="58674"/>
-          </a:xfrm>
-          <a:prstGeom prst="line">
-            <a:avLst/>
-          </a:prstGeom>
-          <a:ln w="9525">
-            <a:solidFill>
-              <a:schemeClr val="tx1"/>
-            </a:solidFill>
-          </a:ln>
-        </p:spPr>
-        <p:style>
-          <a:lnRef idx="1">
-            <a:schemeClr val="accent1"/>
-          </a:lnRef>
-          <a:fillRef idx="0">
-            <a:schemeClr val="accent1"/>
-          </a:fillRef>
-          <a:effectRef idx="0">
-            <a:schemeClr val="accent1"/>
-          </a:effectRef>
-          <a:fontRef idx="minor">
-            <a:schemeClr val="tx1"/>
-          </a:fontRef>
-        </p:style>
-      </p:cxnSp>
-      <p:pic>
-        <p:nvPicPr>
-          <p:cNvPr id="22" name="Picture 21">
-            <a:extLst>
-              <a:ext uri="{FF2B5EF4-FFF2-40B4-BE49-F238E27FC236}">
-                <a16:creationId xmlns:a16="http://schemas.microsoft.com/office/drawing/2014/main" id="{8D2507C5-4B85-F744-94E5-3498072BC853}"/>
-              </a:ext>
-            </a:extLst>
-          </p:cNvPr>
-          <p:cNvPicPr>
-            <a:picLocks noChangeAspect="1"/>
-          </p:cNvPicPr>
-          <p:nvPr/>
-        </p:nvPicPr>
-        <p:blipFill rotWithShape="1">
-          <a:blip r:embed="rId3"/>
-          <a:srcRect l="1605" t="46045" r="93851" b="44888"/>
-          <a:stretch/>
-        </p:blipFill>
-        <p:spPr>
-          <a:xfrm>
-            <a:off x="1194816" y="2539746"/>
-            <a:ext cx="140208" cy="621792"/>
-          </a:xfrm>
-          <a:prstGeom prst="rect">
-            <a:avLst/>
-          </a:prstGeom>
-        </p:spPr>
-      </p:pic>
-      <p:pic>
-        <p:nvPicPr>
-          <p:cNvPr id="5" name="Picture 4">
-            <a:extLst>
-              <a:ext uri="{FF2B5EF4-FFF2-40B4-BE49-F238E27FC236}">
-                <a16:creationId xmlns:a16="http://schemas.microsoft.com/office/drawing/2014/main" id="{7117FF23-16F6-4C49-B566-6BAE18E3515C}"/>
-              </a:ext>
-            </a:extLst>
-          </p:cNvPr>
-          <p:cNvPicPr>
-            <a:picLocks noChangeAspect="1"/>
-          </p:cNvPicPr>
-          <p:nvPr/>
-        </p:nvPicPr>
-        <p:blipFill>
-          <a:blip r:embed="rId4"/>
-          <a:stretch>
-            <a:fillRect/>
-          </a:stretch>
-        </p:blipFill>
-        <p:spPr>
-          <a:xfrm>
-            <a:off x="4399239" y="710438"/>
-            <a:ext cx="7251700" cy="4902200"/>
-          </a:xfrm>
-          <a:prstGeom prst="rect">
-            <a:avLst/>
-          </a:prstGeom>
-        </p:spPr>
-      </p:pic>
-    </p:spTree>
-    <p:extLst>
-      <p:ext uri="{BB962C8B-B14F-4D97-AF65-F5344CB8AC3E}">
-        <p14:creationId xmlns:p14="http://schemas.microsoft.com/office/powerpoint/2010/main" val="3962297623"/>
-      </p:ext>
-    </p:extLst>
-  </p:cSld>
-  <p:clrMapOvr>
-    <a:masterClrMapping/>
-  </p:clrMapOvr>
-</p:sld>
-</file>
-
-<file path=ppt/slides/slide2.xml><?xml version="1.0" encoding="utf-8"?>
-<p:sld xmlns:a="http://schemas.openxmlformats.org/drawingml/2006/main" xmlns:r="http://schemas.openxmlformats.org/officeDocument/2006/relationships" xmlns:p="http://schemas.openxmlformats.org/presentationml/2006/main">
-  <p:cSld>
-    <p:spTree>
-      <p:nvGrpSpPr>
-        <p:cNvPr id="1" name=""/>
-        <p:cNvGrpSpPr/>
-        <p:nvPr/>
-      </p:nvGrpSpPr>
-      <p:grpSpPr>
-        <a:xfrm>
-          <a:off x="0" y="0"/>
-          <a:ext cx="0" cy="0"/>
-          <a:chOff x="0" y="0"/>
-          <a:chExt cx="0" cy="0"/>
-        </a:xfrm>
-      </p:grpSpPr>
-      <p:pic>
-        <p:nvPicPr>
-          <p:cNvPr id="4" name="Picture 3">
-            <a:extLst>
-              <a:ext uri="{FF2B5EF4-FFF2-40B4-BE49-F238E27FC236}">
-                <a16:creationId xmlns:a16="http://schemas.microsoft.com/office/drawing/2014/main" id="{57E91A3B-FFA1-4B47-B2DD-65002704137A}"/>
-              </a:ext>
-            </a:extLst>
-          </p:cNvPr>
-          <p:cNvPicPr>
-            <a:picLocks noChangeAspect="1"/>
-          </p:cNvPicPr>
-          <p:nvPr/>
-        </p:nvPicPr>
-        <p:blipFill rotWithShape="1">
-          <a:blip r:embed="rId2"/>
-          <a:srcRect t="33844" r="86263"/>
-          <a:stretch/>
-        </p:blipFill>
-        <p:spPr>
-          <a:xfrm>
-            <a:off x="1191711" y="2465931"/>
-            <a:ext cx="943856" cy="3243088"/>
-          </a:xfrm>
-          <a:prstGeom prst="rect">
-            <a:avLst/>
-          </a:prstGeom>
-        </p:spPr>
-      </p:pic>
-      <p:pic>
-        <p:nvPicPr>
-          <p:cNvPr id="5" name="Picture 4">
-            <a:extLst>
-              <a:ext uri="{FF2B5EF4-FFF2-40B4-BE49-F238E27FC236}">
-                <a16:creationId xmlns:a16="http://schemas.microsoft.com/office/drawing/2014/main" id="{992A980A-B9AD-6E4C-9741-ECCE0EB6DCD0}"/>
-              </a:ext>
-            </a:extLst>
-          </p:cNvPr>
-          <p:cNvPicPr>
-            <a:picLocks noChangeAspect="1"/>
-          </p:cNvPicPr>
-          <p:nvPr/>
-        </p:nvPicPr>
-        <p:blipFill rotWithShape="1">
-          <a:blip r:embed="rId2"/>
-          <a:srcRect l="92917" r="-3049"/>
-          <a:stretch/>
-        </p:blipFill>
-        <p:spPr>
-          <a:xfrm>
-            <a:off x="7675060" y="806819"/>
-            <a:ext cx="696124" cy="4902200"/>
-          </a:xfrm>
-          <a:prstGeom prst="rect">
-            <a:avLst/>
-          </a:prstGeom>
-        </p:spPr>
-      </p:pic>
-      <p:pic>
-        <p:nvPicPr>
-          <p:cNvPr id="6" name="Picture 5">
-            <a:extLst>
-              <a:ext uri="{FF2B5EF4-FFF2-40B4-BE49-F238E27FC236}">
-                <a16:creationId xmlns:a16="http://schemas.microsoft.com/office/drawing/2014/main" id="{944869A8-0FE2-9B49-B92F-7E721F4CABA9}"/>
-              </a:ext>
-            </a:extLst>
-          </p:cNvPr>
-          <p:cNvPicPr>
-            <a:picLocks noChangeAspect="1"/>
-          </p:cNvPicPr>
-          <p:nvPr/>
-        </p:nvPicPr>
-        <p:blipFill rotWithShape="1">
-          <a:blip r:embed="rId2"/>
-          <a:srcRect l="17543" t="33864" r="12135"/>
-          <a:stretch/>
-        </p:blipFill>
-        <p:spPr>
-          <a:xfrm>
-            <a:off x="2489527" y="2466914"/>
-            <a:ext cx="4831573" cy="3242105"/>
-          </a:xfrm>
-          <a:prstGeom prst="rect">
-            <a:avLst/>
-          </a:prstGeom>
-        </p:spPr>
-      </p:pic>
-      <p:pic>
-        <p:nvPicPr>
-          <p:cNvPr id="7" name="Picture 6">
-            <a:extLst>
-              <a:ext uri="{FF2B5EF4-FFF2-40B4-BE49-F238E27FC236}">
-                <a16:creationId xmlns:a16="http://schemas.microsoft.com/office/drawing/2014/main" id="{AE28EC48-D6BA-5040-A10A-8562641F9769}"/>
-              </a:ext>
-            </a:extLst>
-          </p:cNvPr>
-          <p:cNvPicPr>
-            <a:picLocks noChangeAspect="1"/>
-          </p:cNvPicPr>
-          <p:nvPr/>
-        </p:nvPicPr>
-        <p:blipFill rotWithShape="1">
-          <a:blip r:embed="rId2"/>
-          <a:srcRect r="5037" b="65895"/>
-          <a:stretch/>
-        </p:blipFill>
-        <p:spPr>
-          <a:xfrm>
-            <a:off x="1191711" y="805835"/>
-            <a:ext cx="6524645" cy="1671894"/>
-          </a:xfrm>
-          <a:prstGeom prst="rect">
-            <a:avLst/>
-          </a:prstGeom>
-        </p:spPr>
-      </p:pic>
-      <p:sp>
-        <p:nvSpPr>
-          <p:cNvPr id="8" name="Rectangle 7">
-            <a:extLst>
-              <a:ext uri="{FF2B5EF4-FFF2-40B4-BE49-F238E27FC236}">
-                <a16:creationId xmlns:a16="http://schemas.microsoft.com/office/drawing/2014/main" id="{FCE7CB0D-7D2F-6244-9B5D-10E9359D5B08}"/>
-              </a:ext>
-            </a:extLst>
-          </p:cNvPr>
-          <p:cNvSpPr/>
-          <p:nvPr/>
-        </p:nvSpPr>
-        <p:spPr>
-          <a:xfrm>
-            <a:off x="6766560" y="2589817"/>
-            <a:ext cx="1085481" cy="513244"/>
-          </a:xfrm>
-          <a:prstGeom prst="rect">
-            <a:avLst/>
-          </a:prstGeom>
-          <a:solidFill>
-            <a:schemeClr val="bg1"/>
-          </a:solidFill>
-          <a:ln>
-            <a:solidFill>
-              <a:schemeClr val="bg1"/>
-            </a:solidFill>
-          </a:ln>
-        </p:spPr>
-        <p:style>
-          <a:lnRef idx="2">
-            <a:schemeClr val="accent1">
-              <a:shade val="50000"/>
-            </a:schemeClr>
-          </a:lnRef>
-          <a:fillRef idx="1">
-            <a:schemeClr val="accent1"/>
-          </a:fillRef>
-          <a:effectRef idx="0">
-            <a:schemeClr val="accent1"/>
-          </a:effectRef>
-          <a:fontRef idx="minor">
-            <a:schemeClr val="lt1"/>
-          </a:fontRef>
-        </p:style>
-        <p:txBody>
-          <a:bodyPr rtlCol="0" anchor="ctr"/>
-          <a:lstStyle/>
-          <a:p>
-            <a:pPr algn="ctr"/>
-            <a:endParaRPr lang="en-US"/>
-          </a:p>
-        </p:txBody>
-      </p:sp>
-      <p:pic>
-        <p:nvPicPr>
-          <p:cNvPr id="9" name="Picture 8">
-            <a:extLst>
-              <a:ext uri="{FF2B5EF4-FFF2-40B4-BE49-F238E27FC236}">
-                <a16:creationId xmlns:a16="http://schemas.microsoft.com/office/drawing/2014/main" id="{CF4BB207-DA6D-1E44-BEF0-BF4D2E70A5CB}"/>
-              </a:ext>
-            </a:extLst>
-          </p:cNvPr>
-          <p:cNvPicPr>
-            <a:picLocks noChangeAspect="1"/>
-          </p:cNvPicPr>
-          <p:nvPr/>
-        </p:nvPicPr>
-        <p:blipFill rotWithShape="1">
-          <a:blip r:embed="rId2"/>
-          <a:srcRect l="83544" t="39621" r="4435" b="54001"/>
-          <a:stretch/>
-        </p:blipFill>
-        <p:spPr>
-          <a:xfrm>
-            <a:off x="7026130" y="2790395"/>
-            <a:ext cx="825911" cy="312666"/>
-          </a:xfrm>
-          <a:prstGeom prst="rect">
-            <a:avLst/>
-          </a:prstGeom>
-        </p:spPr>
-      </p:pic>
-      <p:cxnSp>
-        <p:nvCxnSpPr>
-          <p:cNvPr id="10" name="Straight Connector 9">
-            <a:extLst>
-              <a:ext uri="{FF2B5EF4-FFF2-40B4-BE49-F238E27FC236}">
-                <a16:creationId xmlns:a16="http://schemas.microsoft.com/office/drawing/2014/main" id="{8FDC6E40-E69A-B24B-B7AA-FC2FD8E81DDA}"/>
-              </a:ext>
-            </a:extLst>
-          </p:cNvPr>
-          <p:cNvCxnSpPr>
-            <a:cxnSpLocks/>
-          </p:cNvCxnSpPr>
-          <p:nvPr/>
-        </p:nvCxnSpPr>
-        <p:spPr>
-          <a:xfrm flipH="1" flipV="1">
-            <a:off x="2082474" y="4979055"/>
-            <a:ext cx="94387" cy="176984"/>
-          </a:xfrm>
-          <a:prstGeom prst="line">
-            <a:avLst/>
-          </a:prstGeom>
-          <a:ln w="9525">
-            <a:solidFill>
-              <a:schemeClr val="tx1"/>
-            </a:solidFill>
-          </a:ln>
-        </p:spPr>
-        <p:style>
-          <a:lnRef idx="1">
-            <a:schemeClr val="accent1"/>
-          </a:lnRef>
-          <a:fillRef idx="0">
-            <a:schemeClr val="accent1"/>
-          </a:fillRef>
-          <a:effectRef idx="0">
-            <a:schemeClr val="accent1"/>
-          </a:effectRef>
-          <a:fontRef idx="minor">
-            <a:schemeClr val="tx1"/>
-          </a:fontRef>
-        </p:style>
-      </p:cxnSp>
-      <p:cxnSp>
-        <p:nvCxnSpPr>
-          <p:cNvPr id="17" name="Straight Connector 16">
-            <a:extLst>
-              <a:ext uri="{FF2B5EF4-FFF2-40B4-BE49-F238E27FC236}">
-                <a16:creationId xmlns:a16="http://schemas.microsoft.com/office/drawing/2014/main" id="{F98F1F39-8A55-E14D-A717-5009339E4A9A}"/>
-              </a:ext>
-            </a:extLst>
-          </p:cNvPr>
-          <p:cNvCxnSpPr>
-            <a:cxnSpLocks/>
-          </p:cNvCxnSpPr>
-          <p:nvPr/>
-        </p:nvCxnSpPr>
-        <p:spPr>
-          <a:xfrm flipH="1" flipV="1">
-            <a:off x="2430535" y="4979055"/>
-            <a:ext cx="94387" cy="176984"/>
-          </a:xfrm>
-          <a:prstGeom prst="line">
-            <a:avLst/>
-          </a:prstGeom>
-          <a:ln w="9525">
-            <a:solidFill>
-              <a:schemeClr val="tx1"/>
-            </a:solidFill>
-          </a:ln>
-        </p:spPr>
-        <p:style>
-          <a:lnRef idx="1">
-            <a:schemeClr val="accent1"/>
-          </a:lnRef>
-          <a:fillRef idx="0">
-            <a:schemeClr val="accent1"/>
-          </a:fillRef>
-          <a:effectRef idx="0">
-            <a:schemeClr val="accent1"/>
-          </a:effectRef>
-          <a:fontRef idx="minor">
-            <a:schemeClr val="tx1"/>
-          </a:fontRef>
-        </p:style>
-      </p:cxnSp>
-      <p:cxnSp>
-        <p:nvCxnSpPr>
-          <p:cNvPr id="18" name="Straight Connector 17">
-            <a:extLst>
-              <a:ext uri="{FF2B5EF4-FFF2-40B4-BE49-F238E27FC236}">
-                <a16:creationId xmlns:a16="http://schemas.microsoft.com/office/drawing/2014/main" id="{03E1D457-0117-024E-99FA-C9CEA7E102E5}"/>
-              </a:ext>
-            </a:extLst>
-          </p:cNvPr>
-          <p:cNvCxnSpPr>
-            <a:cxnSpLocks/>
-          </p:cNvCxnSpPr>
-          <p:nvPr/>
-        </p:nvCxnSpPr>
-        <p:spPr>
-          <a:xfrm flipH="1" flipV="1">
-            <a:off x="7273906" y="4979055"/>
-            <a:ext cx="94387" cy="176984"/>
-          </a:xfrm>
-          <a:prstGeom prst="line">
-            <a:avLst/>
-          </a:prstGeom>
-          <a:ln w="9525">
-            <a:solidFill>
-              <a:schemeClr val="tx1"/>
-            </a:solidFill>
-          </a:ln>
-        </p:spPr>
-        <p:style>
-          <a:lnRef idx="1">
-            <a:schemeClr val="accent1"/>
-          </a:lnRef>
-          <a:fillRef idx="0">
-            <a:schemeClr val="accent1"/>
-          </a:fillRef>
-          <a:effectRef idx="0">
-            <a:schemeClr val="accent1"/>
-          </a:effectRef>
-          <a:fontRef idx="minor">
-            <a:schemeClr val="tx1"/>
-          </a:fontRef>
-        </p:style>
-      </p:cxnSp>
-      <p:cxnSp>
-        <p:nvCxnSpPr>
-          <p:cNvPr id="19" name="Straight Connector 18">
-            <a:extLst>
-              <a:ext uri="{FF2B5EF4-FFF2-40B4-BE49-F238E27FC236}">
-                <a16:creationId xmlns:a16="http://schemas.microsoft.com/office/drawing/2014/main" id="{A6D9BD40-9F08-8644-B2B0-DC610611D700}"/>
-              </a:ext>
-            </a:extLst>
-          </p:cNvPr>
-          <p:cNvCxnSpPr>
-            <a:cxnSpLocks/>
-          </p:cNvCxnSpPr>
-          <p:nvPr/>
-        </p:nvCxnSpPr>
-        <p:spPr>
-          <a:xfrm flipH="1" flipV="1">
-            <a:off x="7616068" y="4979055"/>
-            <a:ext cx="94387" cy="176984"/>
-          </a:xfrm>
-          <a:prstGeom prst="line">
-            <a:avLst/>
-          </a:prstGeom>
-          <a:ln w="9525">
-            <a:solidFill>
-              <a:schemeClr val="tx1"/>
-            </a:solidFill>
-          </a:ln>
-        </p:spPr>
-        <p:style>
-          <a:lnRef idx="1">
-            <a:schemeClr val="accent1"/>
-          </a:lnRef>
-          <a:fillRef idx="0">
-            <a:schemeClr val="accent1"/>
-          </a:fillRef>
-          <a:effectRef idx="0">
-            <a:schemeClr val="accent1"/>
-          </a:effectRef>
-          <a:fontRef idx="minor">
-            <a:schemeClr val="tx1"/>
-          </a:fontRef>
-        </p:style>
-      </p:cxnSp>
-    </p:spTree>
-    <p:extLst>
-      <p:ext uri="{BB962C8B-B14F-4D97-AF65-F5344CB8AC3E}">
-        <p14:creationId xmlns:p14="http://schemas.microsoft.com/office/powerpoint/2010/main" val="4000667847"/>
-      </p:ext>
-    </p:extLst>
-  </p:cSld>
-  <p:clrMapOvr>
-    <a:masterClrMapping/>
-  </p:clrMapOvr>
-</p:sld>
-</file>
-
-<file path=ppt/slides/slide3.xml><?xml version="1.0" encoding="utf-8"?>
-<p:sld xmlns:a="http://schemas.openxmlformats.org/drawingml/2006/main" xmlns:r="http://schemas.openxmlformats.org/officeDocument/2006/relationships" xmlns:p="http://schemas.openxmlformats.org/presentationml/2006/main">
-  <p:cSld>
-    <p:spTree>
-      <p:nvGrpSpPr>
-        <p:cNvPr id="1" name=""/>
-        <p:cNvGrpSpPr/>
-        <p:nvPr/>
-      </p:nvGrpSpPr>
-      <p:grpSpPr>
-        <a:xfrm>
-          <a:off x="0" y="0"/>
-          <a:ext cx="0" cy="0"/>
-          <a:chOff x="0" y="0"/>
-          <a:chExt cx="0" cy="0"/>
-        </a:xfrm>
-      </p:grpSpPr>
-      <p:pic>
-        <p:nvPicPr>
-          <p:cNvPr id="8" name="Picture 7">
-            <a:extLst>
-              <a:ext uri="{FF2B5EF4-FFF2-40B4-BE49-F238E27FC236}">
-                <a16:creationId xmlns:a16="http://schemas.microsoft.com/office/drawing/2014/main" id="{551A11C6-4988-634E-8971-5D637F6FEE53}"/>
-              </a:ext>
-            </a:extLst>
-          </p:cNvPr>
-          <p:cNvPicPr>
-            <a:picLocks noChangeAspect="1"/>
-          </p:cNvPicPr>
-          <p:nvPr/>
-        </p:nvPicPr>
-        <p:blipFill rotWithShape="1">
-          <a:blip r:embed="rId2"/>
-          <a:srcRect r="82161"/>
-          <a:stretch/>
-        </p:blipFill>
-        <p:spPr>
-          <a:xfrm>
-            <a:off x="800632" y="509860"/>
-            <a:ext cx="1293639" cy="4902200"/>
-          </a:xfrm>
-          <a:prstGeom prst="rect">
-            <a:avLst/>
-          </a:prstGeom>
-        </p:spPr>
-      </p:pic>
-      <p:pic>
-        <p:nvPicPr>
-          <p:cNvPr id="9" name="Picture 8">
-            <a:extLst>
-              <a:ext uri="{FF2B5EF4-FFF2-40B4-BE49-F238E27FC236}">
-                <a16:creationId xmlns:a16="http://schemas.microsoft.com/office/drawing/2014/main" id="{B6F81C14-870B-ED42-A68F-D4FA4B665037}"/>
-              </a:ext>
-            </a:extLst>
-          </p:cNvPr>
-          <p:cNvPicPr>
-            <a:picLocks noChangeAspect="1"/>
-          </p:cNvPicPr>
-          <p:nvPr/>
-        </p:nvPicPr>
-        <p:blipFill rotWithShape="1">
-          <a:blip r:embed="rId2"/>
-          <a:srcRect l="22964" t="28951" r="20248"/>
-          <a:stretch/>
-        </p:blipFill>
-        <p:spPr>
-          <a:xfrm>
-            <a:off x="2471831" y="1929089"/>
-            <a:ext cx="4118044" cy="3482970"/>
-          </a:xfrm>
-          <a:prstGeom prst="rect">
-            <a:avLst/>
-          </a:prstGeom>
-        </p:spPr>
-      </p:pic>
       <p:grpSp>
         <p:nvGrpSpPr>
-          <p:cNvPr id="12" name="Group 11">
-            <a:extLst>
-              <a:ext uri="{FF2B5EF4-FFF2-40B4-BE49-F238E27FC236}">
-                <a16:creationId xmlns:a16="http://schemas.microsoft.com/office/drawing/2014/main" id="{A392C303-37A8-9A46-9203-E500997D4D87}"/>
+          <p:cNvPr id="21" name="Group 20">
+            <a:extLst>
+              <a:ext uri="{FF2B5EF4-FFF2-40B4-BE49-F238E27FC236}">
+                <a16:creationId xmlns:a16="http://schemas.microsoft.com/office/drawing/2014/main" id="{0A424656-B6B5-A046-85B3-14799BCA0BE1}"/>
               </a:ext>
             </a:extLst>
           </p:cNvPr>
@@ -4121,18 +3340,18 @@
         </p:nvGrpSpPr>
         <p:grpSpPr>
           <a:xfrm>
-            <a:off x="6760668" y="509860"/>
-            <a:ext cx="855119" cy="4902200"/>
-            <a:chOff x="7675061" y="509860"/>
-            <a:chExt cx="855119" cy="4902200"/>
+            <a:off x="2341566" y="983993"/>
+            <a:ext cx="6815155" cy="4902200"/>
+            <a:chOff x="800632" y="509860"/>
+            <a:chExt cx="6815155" cy="4902200"/>
           </a:xfrm>
         </p:grpSpPr>
         <p:pic>
           <p:nvPicPr>
-            <p:cNvPr id="10" name="Picture 9">
+            <p:cNvPr id="8" name="Picture 7">
               <a:extLst>
                 <a:ext uri="{FF2B5EF4-FFF2-40B4-BE49-F238E27FC236}">
-                  <a16:creationId xmlns:a16="http://schemas.microsoft.com/office/drawing/2014/main" id="{476A0B00-9885-D741-BAEA-9DECB018DEC2}"/>
+                  <a16:creationId xmlns:a16="http://schemas.microsoft.com/office/drawing/2014/main" id="{551A11C6-4988-634E-8971-5D637F6FEE53}"/>
                 </a:ext>
               </a:extLst>
             </p:cNvPr>
@@ -4143,338 +3362,387 @@
           </p:nvPicPr>
           <p:blipFill rotWithShape="1">
             <a:blip r:embed="rId2"/>
-            <a:srcRect l="90323"/>
+            <a:srcRect r="82161"/>
             <a:stretch/>
           </p:blipFill>
           <p:spPr>
             <a:xfrm>
-              <a:off x="7828444" y="509860"/>
-              <a:ext cx="701736" cy="4902200"/>
+              <a:off x="800632" y="509860"/>
+              <a:ext cx="1293639" cy="4902200"/>
             </a:xfrm>
             <a:prstGeom prst="rect">
               <a:avLst/>
             </a:prstGeom>
           </p:spPr>
         </p:pic>
-        <p:sp>
-          <p:nvSpPr>
-            <p:cNvPr id="11" name="Rectangle 10">
+        <p:pic>
+          <p:nvPicPr>
+            <p:cNvPr id="9" name="Picture 8">
               <a:extLst>
                 <a:ext uri="{FF2B5EF4-FFF2-40B4-BE49-F238E27FC236}">
-                  <a16:creationId xmlns:a16="http://schemas.microsoft.com/office/drawing/2014/main" id="{E2A9F162-CE9F-8B43-AE1C-0CFA92F8B5B4}"/>
+                  <a16:creationId xmlns:a16="http://schemas.microsoft.com/office/drawing/2014/main" id="{B6F81C14-870B-ED42-A68F-D4FA4B665037}"/>
                 </a:ext>
               </a:extLst>
             </p:cNvPr>
-            <p:cNvSpPr/>
+            <p:cNvPicPr>
+              <a:picLocks noChangeAspect="1"/>
+            </p:cNvPicPr>
             <p:nvPr/>
-          </p:nvSpPr>
+          </p:nvPicPr>
+          <p:blipFill rotWithShape="1">
+            <a:blip r:embed="rId2"/>
+            <a:srcRect l="22964" t="28951" r="20248"/>
+            <a:stretch/>
+          </p:blipFill>
           <p:spPr>
             <a:xfrm>
-              <a:off x="7675061" y="2347943"/>
-              <a:ext cx="542740" cy="436552"/>
+              <a:off x="2471831" y="1929089"/>
+              <a:ext cx="4118044" cy="3482970"/>
             </a:xfrm>
             <a:prstGeom prst="rect">
               <a:avLst/>
             </a:prstGeom>
-            <a:solidFill>
-              <a:schemeClr val="bg1"/>
-            </a:solidFill>
-            <a:ln>
+          </p:spPr>
+        </p:pic>
+        <p:grpSp>
+          <p:nvGrpSpPr>
+            <p:cNvPr id="12" name="Group 11">
+              <a:extLst>
+                <a:ext uri="{FF2B5EF4-FFF2-40B4-BE49-F238E27FC236}">
+                  <a16:creationId xmlns:a16="http://schemas.microsoft.com/office/drawing/2014/main" id="{A392C303-37A8-9A46-9203-E500997D4D87}"/>
+                </a:ext>
+              </a:extLst>
+            </p:cNvPr>
+            <p:cNvGrpSpPr/>
+            <p:nvPr/>
+          </p:nvGrpSpPr>
+          <p:grpSpPr>
+            <a:xfrm>
+              <a:off x="6760668" y="509860"/>
+              <a:ext cx="855119" cy="4902200"/>
+              <a:chOff x="7675061" y="509860"/>
+              <a:chExt cx="855119" cy="4902200"/>
+            </a:xfrm>
+          </p:grpSpPr>
+          <p:pic>
+            <p:nvPicPr>
+              <p:cNvPr id="10" name="Picture 9">
+                <a:extLst>
+                  <a:ext uri="{FF2B5EF4-FFF2-40B4-BE49-F238E27FC236}">
+                    <a16:creationId xmlns:a16="http://schemas.microsoft.com/office/drawing/2014/main" id="{476A0B00-9885-D741-BAEA-9DECB018DEC2}"/>
+                  </a:ext>
+                </a:extLst>
+              </p:cNvPr>
+              <p:cNvPicPr>
+                <a:picLocks noChangeAspect="1"/>
+              </p:cNvPicPr>
+              <p:nvPr/>
+            </p:nvPicPr>
+            <p:blipFill rotWithShape="1">
+              <a:blip r:embed="rId2"/>
+              <a:srcRect l="90323"/>
+              <a:stretch/>
+            </p:blipFill>
+            <p:spPr>
+              <a:xfrm>
+                <a:off x="7828444" y="509860"/>
+                <a:ext cx="701736" cy="4902200"/>
+              </a:xfrm>
+              <a:prstGeom prst="rect">
+                <a:avLst/>
+              </a:prstGeom>
+            </p:spPr>
+          </p:pic>
+          <p:sp>
+            <p:nvSpPr>
+              <p:cNvPr id="11" name="Rectangle 10">
+                <a:extLst>
+                  <a:ext uri="{FF2B5EF4-FFF2-40B4-BE49-F238E27FC236}">
+                    <a16:creationId xmlns:a16="http://schemas.microsoft.com/office/drawing/2014/main" id="{E2A9F162-CE9F-8B43-AE1C-0CFA92F8B5B4}"/>
+                  </a:ext>
+                </a:extLst>
+              </p:cNvPr>
+              <p:cNvSpPr/>
+              <p:nvPr/>
+            </p:nvSpPr>
+            <p:spPr>
+              <a:xfrm>
+                <a:off x="7675061" y="2347943"/>
+                <a:ext cx="542740" cy="436552"/>
+              </a:xfrm>
+              <a:prstGeom prst="rect">
+                <a:avLst/>
+              </a:prstGeom>
               <a:solidFill>
                 <a:schemeClr val="bg1"/>
+              </a:solidFill>
+              <a:ln>
+                <a:solidFill>
+                  <a:schemeClr val="bg1"/>
+                </a:solidFill>
+              </a:ln>
+            </p:spPr>
+            <p:style>
+              <a:lnRef idx="2">
+                <a:schemeClr val="accent1">
+                  <a:shade val="50000"/>
+                </a:schemeClr>
+              </a:lnRef>
+              <a:fillRef idx="1">
+                <a:schemeClr val="accent1"/>
+              </a:fillRef>
+              <a:effectRef idx="0">
+                <a:schemeClr val="accent1"/>
+              </a:effectRef>
+              <a:fontRef idx="minor">
+                <a:schemeClr val="lt1"/>
+              </a:fontRef>
+            </p:style>
+            <p:txBody>
+              <a:bodyPr rtlCol="0" anchor="ctr"/>
+              <a:lstStyle/>
+              <a:p>
+                <a:pPr algn="ctr"/>
+                <a:endParaRPr lang="en-US"/>
+              </a:p>
+            </p:txBody>
+          </p:sp>
+        </p:grpSp>
+        <p:pic>
+          <p:nvPicPr>
+            <p:cNvPr id="14" name="Picture 13">
+              <a:extLst>
+                <a:ext uri="{FF2B5EF4-FFF2-40B4-BE49-F238E27FC236}">
+                  <a16:creationId xmlns:a16="http://schemas.microsoft.com/office/drawing/2014/main" id="{DB36F83A-7662-F149-B367-FB23229952F2}"/>
+                </a:ext>
+              </a:extLst>
+            </p:cNvPr>
+            <p:cNvPicPr>
+              <a:picLocks noChangeAspect="1"/>
+            </p:cNvPicPr>
+            <p:nvPr/>
+          </p:nvPicPr>
+          <p:blipFill rotWithShape="1">
+            <a:blip r:embed="rId2"/>
+            <a:srcRect l="84303" t="39059" r="4145" b="53961"/>
+            <a:stretch/>
+          </p:blipFill>
+          <p:spPr>
+            <a:xfrm>
+              <a:off x="6465698" y="2442332"/>
+              <a:ext cx="837710" cy="342163"/>
+            </a:xfrm>
+            <a:prstGeom prst="rect">
+              <a:avLst/>
+            </a:prstGeom>
+          </p:spPr>
+        </p:pic>
+        <p:cxnSp>
+          <p:nvCxnSpPr>
+            <p:cNvPr id="15" name="Straight Connector 14">
+              <a:extLst>
+                <a:ext uri="{FF2B5EF4-FFF2-40B4-BE49-F238E27FC236}">
+                  <a16:creationId xmlns:a16="http://schemas.microsoft.com/office/drawing/2014/main" id="{B089BCC0-470E-E448-A2D5-9362D0D0A6DF}"/>
+                </a:ext>
+              </a:extLst>
+            </p:cNvPr>
+            <p:cNvCxnSpPr>
+              <a:cxnSpLocks/>
+            </p:cNvCxnSpPr>
+            <p:nvPr/>
+          </p:nvCxnSpPr>
+          <p:spPr>
+            <a:xfrm flipH="1" flipV="1">
+              <a:off x="2038233" y="4678188"/>
+              <a:ext cx="94387" cy="176984"/>
+            </a:xfrm>
+            <a:prstGeom prst="line">
+              <a:avLst/>
+            </a:prstGeom>
+            <a:ln w="9525">
+              <a:solidFill>
+                <a:schemeClr val="tx1"/>
               </a:solidFill>
             </a:ln>
           </p:spPr>
           <p:style>
-            <a:lnRef idx="2">
-              <a:schemeClr val="accent1">
-                <a:shade val="50000"/>
-              </a:schemeClr>
+            <a:lnRef idx="1">
+              <a:schemeClr val="accent1"/>
             </a:lnRef>
-            <a:fillRef idx="1">
+            <a:fillRef idx="0">
               <a:schemeClr val="accent1"/>
             </a:fillRef>
             <a:effectRef idx="0">
               <a:schemeClr val="accent1"/>
             </a:effectRef>
             <a:fontRef idx="minor">
-              <a:schemeClr val="lt1"/>
+              <a:schemeClr val="tx1"/>
             </a:fontRef>
           </p:style>
-          <p:txBody>
-            <a:bodyPr rtlCol="0" anchor="ctr"/>
-            <a:lstStyle/>
-            <a:p>
-              <a:pPr algn="ctr"/>
-              <a:endParaRPr lang="en-US"/>
-            </a:p>
-          </p:txBody>
-        </p:sp>
+        </p:cxnSp>
+        <p:cxnSp>
+          <p:nvCxnSpPr>
+            <p:cNvPr id="16" name="Straight Connector 15">
+              <a:extLst>
+                <a:ext uri="{FF2B5EF4-FFF2-40B4-BE49-F238E27FC236}">
+                  <a16:creationId xmlns:a16="http://schemas.microsoft.com/office/drawing/2014/main" id="{792B1180-7B7B-404E-8684-C4F656DC4435}"/>
+                </a:ext>
+              </a:extLst>
+            </p:cNvPr>
+            <p:cNvCxnSpPr>
+              <a:cxnSpLocks/>
+            </p:cNvCxnSpPr>
+            <p:nvPr/>
+          </p:nvCxnSpPr>
+          <p:spPr>
+            <a:xfrm flipH="1" flipV="1">
+              <a:off x="2418737" y="4678188"/>
+              <a:ext cx="94387" cy="176984"/>
+            </a:xfrm>
+            <a:prstGeom prst="line">
+              <a:avLst/>
+            </a:prstGeom>
+            <a:ln w="9525">
+              <a:solidFill>
+                <a:schemeClr val="tx1"/>
+              </a:solidFill>
+            </a:ln>
+          </p:spPr>
+          <p:style>
+            <a:lnRef idx="1">
+              <a:schemeClr val="accent1"/>
+            </a:lnRef>
+            <a:fillRef idx="0">
+              <a:schemeClr val="accent1"/>
+            </a:fillRef>
+            <a:effectRef idx="0">
+              <a:schemeClr val="accent1"/>
+            </a:effectRef>
+            <a:fontRef idx="minor">
+              <a:schemeClr val="tx1"/>
+            </a:fontRef>
+          </p:style>
+        </p:cxnSp>
+        <p:cxnSp>
+          <p:nvCxnSpPr>
+            <p:cNvPr id="17" name="Straight Connector 16">
+              <a:extLst>
+                <a:ext uri="{FF2B5EF4-FFF2-40B4-BE49-F238E27FC236}">
+                  <a16:creationId xmlns:a16="http://schemas.microsoft.com/office/drawing/2014/main" id="{C2B45517-9D84-3241-9B99-825C0746E6E1}"/>
+                </a:ext>
+              </a:extLst>
+            </p:cNvPr>
+            <p:cNvCxnSpPr>
+              <a:cxnSpLocks/>
+            </p:cNvCxnSpPr>
+            <p:nvPr/>
+          </p:nvCxnSpPr>
+          <p:spPr>
+            <a:xfrm flipH="1" flipV="1">
+              <a:off x="6536636" y="4678188"/>
+              <a:ext cx="94387" cy="176984"/>
+            </a:xfrm>
+            <a:prstGeom prst="line">
+              <a:avLst/>
+            </a:prstGeom>
+            <a:ln w="9525">
+              <a:solidFill>
+                <a:schemeClr val="tx1"/>
+              </a:solidFill>
+            </a:ln>
+          </p:spPr>
+          <p:style>
+            <a:lnRef idx="1">
+              <a:schemeClr val="accent1"/>
+            </a:lnRef>
+            <a:fillRef idx="0">
+              <a:schemeClr val="accent1"/>
+            </a:fillRef>
+            <a:effectRef idx="0">
+              <a:schemeClr val="accent1"/>
+            </a:effectRef>
+            <a:fontRef idx="minor">
+              <a:schemeClr val="tx1"/>
+            </a:fontRef>
+          </p:style>
+        </p:cxnSp>
+        <p:cxnSp>
+          <p:nvCxnSpPr>
+            <p:cNvPr id="18" name="Straight Connector 17">
+              <a:extLst>
+                <a:ext uri="{FF2B5EF4-FFF2-40B4-BE49-F238E27FC236}">
+                  <a16:creationId xmlns:a16="http://schemas.microsoft.com/office/drawing/2014/main" id="{61003C47-58AA-4A4C-80D6-D9DCFEA465FB}"/>
+                </a:ext>
+              </a:extLst>
+            </p:cNvPr>
+            <p:cNvCxnSpPr>
+              <a:cxnSpLocks/>
+            </p:cNvCxnSpPr>
+            <p:nvPr/>
+          </p:nvCxnSpPr>
+          <p:spPr>
+            <a:xfrm flipH="1" flipV="1">
+              <a:off x="6858153" y="4678188"/>
+              <a:ext cx="94387" cy="176984"/>
+            </a:xfrm>
+            <a:prstGeom prst="line">
+              <a:avLst/>
+            </a:prstGeom>
+            <a:ln w="9525">
+              <a:solidFill>
+                <a:schemeClr val="tx1"/>
+              </a:solidFill>
+            </a:ln>
+          </p:spPr>
+          <p:style>
+            <a:lnRef idx="1">
+              <a:schemeClr val="accent1"/>
+            </a:lnRef>
+            <a:fillRef idx="0">
+              <a:schemeClr val="accent1"/>
+            </a:fillRef>
+            <a:effectRef idx="0">
+              <a:schemeClr val="accent1"/>
+            </a:effectRef>
+            <a:fontRef idx="minor">
+              <a:schemeClr val="tx1"/>
+            </a:fontRef>
+          </p:style>
+        </p:cxnSp>
+        <p:pic>
+          <p:nvPicPr>
+            <p:cNvPr id="20" name="Picture 19">
+              <a:extLst>
+                <a:ext uri="{FF2B5EF4-FFF2-40B4-BE49-F238E27FC236}">
+                  <a16:creationId xmlns:a16="http://schemas.microsoft.com/office/drawing/2014/main" id="{503B8207-A6C1-A340-8C5E-1B7D84F0358E}"/>
+                </a:ext>
+              </a:extLst>
+            </p:cNvPr>
+            <p:cNvPicPr>
+              <a:picLocks noChangeAspect="1"/>
+            </p:cNvPicPr>
+            <p:nvPr/>
+          </p:nvPicPr>
+          <p:blipFill rotWithShape="1">
+            <a:blip r:embed="rId3"/>
+            <a:srcRect l="21581" r="10734" b="70849"/>
+            <a:stretch/>
+          </p:blipFill>
+          <p:spPr>
+            <a:xfrm>
+              <a:off x="2094271" y="509860"/>
+              <a:ext cx="4908264" cy="1429037"/>
+            </a:xfrm>
+            <a:prstGeom prst="rect">
+              <a:avLst/>
+            </a:prstGeom>
+          </p:spPr>
+        </p:pic>
       </p:grpSp>
-      <p:pic>
-        <p:nvPicPr>
-          <p:cNvPr id="14" name="Picture 13">
-            <a:extLst>
-              <a:ext uri="{FF2B5EF4-FFF2-40B4-BE49-F238E27FC236}">
-                <a16:creationId xmlns:a16="http://schemas.microsoft.com/office/drawing/2014/main" id="{DB36F83A-7662-F149-B367-FB23229952F2}"/>
-              </a:ext>
-            </a:extLst>
-          </p:cNvPr>
-          <p:cNvPicPr>
-            <a:picLocks noChangeAspect="1"/>
-          </p:cNvPicPr>
-          <p:nvPr/>
-        </p:nvPicPr>
-        <p:blipFill rotWithShape="1">
-          <a:blip r:embed="rId2"/>
-          <a:srcRect l="84303" t="39059" r="4145" b="53961"/>
-          <a:stretch/>
-        </p:blipFill>
-        <p:spPr>
-          <a:xfrm>
-            <a:off x="6465698" y="2442332"/>
-            <a:ext cx="837710" cy="342163"/>
-          </a:xfrm>
-          <a:prstGeom prst="rect">
-            <a:avLst/>
-          </a:prstGeom>
-        </p:spPr>
-      </p:pic>
-      <p:cxnSp>
-        <p:nvCxnSpPr>
-          <p:cNvPr id="15" name="Straight Connector 14">
-            <a:extLst>
-              <a:ext uri="{FF2B5EF4-FFF2-40B4-BE49-F238E27FC236}">
-                <a16:creationId xmlns:a16="http://schemas.microsoft.com/office/drawing/2014/main" id="{B089BCC0-470E-E448-A2D5-9362D0D0A6DF}"/>
-              </a:ext>
-            </a:extLst>
-          </p:cNvPr>
-          <p:cNvCxnSpPr>
-            <a:cxnSpLocks/>
-          </p:cNvCxnSpPr>
-          <p:nvPr/>
-        </p:nvCxnSpPr>
-        <p:spPr>
-          <a:xfrm flipH="1" flipV="1">
-            <a:off x="2038233" y="4678188"/>
-            <a:ext cx="94387" cy="176984"/>
-          </a:xfrm>
-          <a:prstGeom prst="line">
-            <a:avLst/>
-          </a:prstGeom>
-          <a:ln w="9525">
-            <a:solidFill>
-              <a:schemeClr val="tx1"/>
-            </a:solidFill>
-          </a:ln>
-        </p:spPr>
-        <p:style>
-          <a:lnRef idx="1">
-            <a:schemeClr val="accent1"/>
-          </a:lnRef>
-          <a:fillRef idx="0">
-            <a:schemeClr val="accent1"/>
-          </a:fillRef>
-          <a:effectRef idx="0">
-            <a:schemeClr val="accent1"/>
-          </a:effectRef>
-          <a:fontRef idx="minor">
-            <a:schemeClr val="tx1"/>
-          </a:fontRef>
-        </p:style>
-      </p:cxnSp>
-      <p:cxnSp>
-        <p:nvCxnSpPr>
-          <p:cNvPr id="16" name="Straight Connector 15">
-            <a:extLst>
-              <a:ext uri="{FF2B5EF4-FFF2-40B4-BE49-F238E27FC236}">
-                <a16:creationId xmlns:a16="http://schemas.microsoft.com/office/drawing/2014/main" id="{792B1180-7B7B-404E-8684-C4F656DC4435}"/>
-              </a:ext>
-            </a:extLst>
-          </p:cNvPr>
-          <p:cNvCxnSpPr>
-            <a:cxnSpLocks/>
-          </p:cNvCxnSpPr>
-          <p:nvPr/>
-        </p:nvCxnSpPr>
-        <p:spPr>
-          <a:xfrm flipH="1" flipV="1">
-            <a:off x="2418737" y="4678188"/>
-            <a:ext cx="94387" cy="176984"/>
-          </a:xfrm>
-          <a:prstGeom prst="line">
-            <a:avLst/>
-          </a:prstGeom>
-          <a:ln w="9525">
-            <a:solidFill>
-              <a:schemeClr val="tx1"/>
-            </a:solidFill>
-          </a:ln>
-        </p:spPr>
-        <p:style>
-          <a:lnRef idx="1">
-            <a:schemeClr val="accent1"/>
-          </a:lnRef>
-          <a:fillRef idx="0">
-            <a:schemeClr val="accent1"/>
-          </a:fillRef>
-          <a:effectRef idx="0">
-            <a:schemeClr val="accent1"/>
-          </a:effectRef>
-          <a:fontRef idx="minor">
-            <a:schemeClr val="tx1"/>
-          </a:fontRef>
-        </p:style>
-      </p:cxnSp>
-      <p:cxnSp>
-        <p:nvCxnSpPr>
-          <p:cNvPr id="17" name="Straight Connector 16">
-            <a:extLst>
-              <a:ext uri="{FF2B5EF4-FFF2-40B4-BE49-F238E27FC236}">
-                <a16:creationId xmlns:a16="http://schemas.microsoft.com/office/drawing/2014/main" id="{C2B45517-9D84-3241-9B99-825C0746E6E1}"/>
-              </a:ext>
-            </a:extLst>
-          </p:cNvPr>
-          <p:cNvCxnSpPr>
-            <a:cxnSpLocks/>
-          </p:cNvCxnSpPr>
-          <p:nvPr/>
-        </p:nvCxnSpPr>
-        <p:spPr>
-          <a:xfrm flipH="1" flipV="1">
-            <a:off x="6536636" y="4678188"/>
-            <a:ext cx="94387" cy="176984"/>
-          </a:xfrm>
-          <a:prstGeom prst="line">
-            <a:avLst/>
-          </a:prstGeom>
-          <a:ln w="9525">
-            <a:solidFill>
-              <a:schemeClr val="tx1"/>
-            </a:solidFill>
-          </a:ln>
-        </p:spPr>
-        <p:style>
-          <a:lnRef idx="1">
-            <a:schemeClr val="accent1"/>
-          </a:lnRef>
-          <a:fillRef idx="0">
-            <a:schemeClr val="accent1"/>
-          </a:fillRef>
-          <a:effectRef idx="0">
-            <a:schemeClr val="accent1"/>
-          </a:effectRef>
-          <a:fontRef idx="minor">
-            <a:schemeClr val="tx1"/>
-          </a:fontRef>
-        </p:style>
-      </p:cxnSp>
-      <p:cxnSp>
-        <p:nvCxnSpPr>
-          <p:cNvPr id="18" name="Straight Connector 17">
-            <a:extLst>
-              <a:ext uri="{FF2B5EF4-FFF2-40B4-BE49-F238E27FC236}">
-                <a16:creationId xmlns:a16="http://schemas.microsoft.com/office/drawing/2014/main" id="{61003C47-58AA-4A4C-80D6-D9DCFEA465FB}"/>
-              </a:ext>
-            </a:extLst>
-          </p:cNvPr>
-          <p:cNvCxnSpPr>
-            <a:cxnSpLocks/>
-          </p:cNvCxnSpPr>
-          <p:nvPr/>
-        </p:nvCxnSpPr>
-        <p:spPr>
-          <a:xfrm flipH="1" flipV="1">
-            <a:off x="6858153" y="4678188"/>
-            <a:ext cx="94387" cy="176984"/>
-          </a:xfrm>
-          <a:prstGeom prst="line">
-            <a:avLst/>
-          </a:prstGeom>
-          <a:ln w="9525">
-            <a:solidFill>
-              <a:schemeClr val="tx1"/>
-            </a:solidFill>
-          </a:ln>
-        </p:spPr>
-        <p:style>
-          <a:lnRef idx="1">
-            <a:schemeClr val="accent1"/>
-          </a:lnRef>
-          <a:fillRef idx="0">
-            <a:schemeClr val="accent1"/>
-          </a:fillRef>
-          <a:effectRef idx="0">
-            <a:schemeClr val="accent1"/>
-          </a:effectRef>
-          <a:fontRef idx="minor">
-            <a:schemeClr val="tx1"/>
-          </a:fontRef>
-        </p:style>
-      </p:cxnSp>
-      <p:pic>
-        <p:nvPicPr>
-          <p:cNvPr id="20" name="Picture 19">
-            <a:extLst>
-              <a:ext uri="{FF2B5EF4-FFF2-40B4-BE49-F238E27FC236}">
-                <a16:creationId xmlns:a16="http://schemas.microsoft.com/office/drawing/2014/main" id="{503B8207-A6C1-A340-8C5E-1B7D84F0358E}"/>
-              </a:ext>
-            </a:extLst>
-          </p:cNvPr>
-          <p:cNvPicPr>
-            <a:picLocks noChangeAspect="1"/>
-          </p:cNvPicPr>
-          <p:nvPr/>
-        </p:nvPicPr>
-        <p:blipFill rotWithShape="1">
-          <a:blip r:embed="rId3"/>
-          <a:srcRect l="21581" r="10734" b="70849"/>
-          <a:stretch/>
-        </p:blipFill>
-        <p:spPr>
-          <a:xfrm>
-            <a:off x="2094271" y="509860"/>
-            <a:ext cx="4908264" cy="1429037"/>
-          </a:xfrm>
-          <a:prstGeom prst="rect">
-            <a:avLst/>
-          </a:prstGeom>
-        </p:spPr>
-      </p:pic>
     </p:spTree>
     <p:extLst>
       <p:ext uri="{BB962C8B-B14F-4D97-AF65-F5344CB8AC3E}">
         <p14:creationId xmlns:p14="http://schemas.microsoft.com/office/powerpoint/2010/main" val="3026890174"/>
-      </p:ext>
-    </p:extLst>
-  </p:cSld>
-  <p:clrMapOvr>
-    <a:masterClrMapping/>
-  </p:clrMapOvr>
-</p:sld>
-</file>
-
-<file path=ppt/slides/slide4.xml><?xml version="1.0" encoding="utf-8"?>
-<p:sld xmlns:a="http://schemas.openxmlformats.org/drawingml/2006/main" xmlns:r="http://schemas.openxmlformats.org/officeDocument/2006/relationships" xmlns:p="http://schemas.openxmlformats.org/presentationml/2006/main">
-  <p:cSld>
-    <p:spTree>
-      <p:nvGrpSpPr>
-        <p:cNvPr id="1" name=""/>
-        <p:cNvGrpSpPr/>
-        <p:nvPr/>
-      </p:nvGrpSpPr>
-      <p:grpSpPr>
-        <a:xfrm>
-          <a:off x="0" y="0"/>
-          <a:ext cx="0" cy="0"/>
-          <a:chOff x="0" y="0"/>
-          <a:chExt cx="0" cy="0"/>
-        </a:xfrm>
-      </p:grpSpPr>
-    </p:spTree>
-    <p:extLst>
-      <p:ext uri="{BB962C8B-B14F-4D97-AF65-F5344CB8AC3E}">
-        <p14:creationId xmlns:p14="http://schemas.microsoft.com/office/powerpoint/2010/main" val="3791929653"/>
       </p:ext>
     </p:extLst>
   </p:cSld>

</xml_diff>